<commit_message>
Doku, Testing und Powerpoint
</commit_message>
<xml_diff>
--- a/Präsentation.pptx
+++ b/Präsentation.pptx
@@ -5,21 +5,20 @@
     <p:sldMasterId id="2147483661" r:id="rId4"/>
   </p:sldMasterIdLst>
   <p:notesMasterIdLst>
-    <p:notesMasterId r:id="rId14"/>
+    <p:notesMasterId r:id="rId13"/>
   </p:notesMasterIdLst>
   <p:handoutMasterIdLst>
-    <p:handoutMasterId r:id="rId15"/>
+    <p:handoutMasterId r:id="rId14"/>
   </p:handoutMasterIdLst>
   <p:sldIdLst>
     <p:sldId id="256" r:id="rId5"/>
     <p:sldId id="278" r:id="rId6"/>
     <p:sldId id="279" r:id="rId7"/>
-    <p:sldId id="280" r:id="rId8"/>
-    <p:sldId id="292" r:id="rId9"/>
-    <p:sldId id="281" r:id="rId10"/>
+    <p:sldId id="292" r:id="rId8"/>
+    <p:sldId id="281" r:id="rId9"/>
+    <p:sldId id="295" r:id="rId10"/>
     <p:sldId id="291" r:id="rId11"/>
-    <p:sldId id="294" r:id="rId12"/>
-    <p:sldId id="290" r:id="rId13"/>
+    <p:sldId id="290" r:id="rId12"/>
   </p:sldIdLst>
   <p:sldSz cx="12192000" cy="6858000"/>
   <p:notesSz cx="6858000" cy="9144000"/>
@@ -6137,7 +6136,7 @@
         </p:nvSpPr>
         <p:spPr>
           <a:xfrm>
-            <a:off x="4309349" y="3429000"/>
+            <a:off x="8060174" y="3688375"/>
             <a:ext cx="7501651" cy="1090938"/>
           </a:xfrm>
         </p:spPr>
@@ -6176,7 +6175,7 @@
         </p:nvSpPr>
         <p:spPr>
           <a:xfrm>
-            <a:off x="4309349" y="4779313"/>
+            <a:off x="8060175" y="4779313"/>
             <a:ext cx="7501650" cy="514816"/>
           </a:xfrm>
         </p:spPr>
@@ -7350,184 +7349,7 @@
           <a:p>
             <a:r>
               <a:rPr lang="de-CH" dirty="0"/>
-              <a:t>Projekt</a:t>
-            </a:r>
-          </a:p>
-        </p:txBody>
-      </p:sp>
-      <p:pic>
-        <p:nvPicPr>
-          <p:cNvPr id="20" name="Grafik 19">
-            <a:extLst>
-              <a:ext uri="{FF2B5EF4-FFF2-40B4-BE49-F238E27FC236}">
-                <a16:creationId xmlns:a16="http://schemas.microsoft.com/office/drawing/2014/main" id="{525FB338-DCAB-4A75-ABC9-B600D9003D68}"/>
-              </a:ext>
-            </a:extLst>
-          </p:cNvPr>
-          <p:cNvPicPr>
-            <a:picLocks noChangeAspect="1"/>
-          </p:cNvPicPr>
-          <p:nvPr/>
-        </p:nvPicPr>
-        <p:blipFill>
-          <a:blip r:embed="rId2"/>
-          <a:stretch>
-            <a:fillRect/>
-          </a:stretch>
-        </p:blipFill>
-        <p:spPr>
-          <a:xfrm>
-            <a:off x="791241" y="2548469"/>
-            <a:ext cx="5304759" cy="2953164"/>
-          </a:xfrm>
-          <a:prstGeom prst="rect">
-            <a:avLst/>
-          </a:prstGeom>
-          <a:effectLst>
-            <a:innerShdw blurRad="57150" dist="38100" dir="14460000">
-              <a:prstClr val="black">
-                <a:alpha val="70000"/>
-              </a:prstClr>
-            </a:innerShdw>
-          </a:effectLst>
-        </p:spPr>
-      </p:pic>
-      <p:sp>
-        <p:nvSpPr>
-          <p:cNvPr id="18" name="Inhaltsplatzhalter 17">
-            <a:extLst>
-              <a:ext uri="{FF2B5EF4-FFF2-40B4-BE49-F238E27FC236}">
-                <a16:creationId xmlns:a16="http://schemas.microsoft.com/office/drawing/2014/main" id="{B42D32D8-68F1-4CC8-BAA9-8F422CC01B82}"/>
-              </a:ext>
-            </a:extLst>
-          </p:cNvPr>
-          <p:cNvSpPr>
-            <a:spLocks noGrp="1"/>
-          </p:cNvSpPr>
-          <p:nvPr>
-            <p:ph idx="1"/>
-          </p:nvPr>
-        </p:nvSpPr>
-        <p:spPr>
-          <a:xfrm>
-            <a:off x="6728980" y="2384647"/>
-            <a:ext cx="4419171" cy="3575884"/>
-          </a:xfrm>
-        </p:spPr>
-        <p:txBody>
-          <a:bodyPr>
-            <a:normAutofit/>
-          </a:bodyPr>
-          <a:lstStyle/>
-          <a:p>
-            <a:r>
-              <a:rPr lang="de-CH" dirty="0"/>
-              <a:t>Linear</a:t>
-            </a:r>
-          </a:p>
-          <a:p>
-            <a:r>
-              <a:rPr lang="de-CH" dirty="0"/>
-              <a:t>Phasen (Meilensteine)</a:t>
-            </a:r>
-          </a:p>
-          <a:p>
-            <a:r>
-              <a:rPr lang="de-CH" dirty="0"/>
-              <a:t>Einfach</a:t>
-            </a:r>
-          </a:p>
-          <a:p>
-            <a:endParaRPr lang="de-CH" dirty="0"/>
-          </a:p>
-        </p:txBody>
-      </p:sp>
-    </p:spTree>
-    <p:extLst>
-      <p:ext uri="{BB962C8B-B14F-4D97-AF65-F5344CB8AC3E}">
-        <p14:creationId xmlns:p14="http://schemas.microsoft.com/office/powerpoint/2010/main" val="3617868884"/>
-      </p:ext>
-    </p:extLst>
-  </p:cSld>
-  <p:clrMapOvr>
-    <a:masterClrMapping/>
-  </p:clrMapOvr>
-</p:sld>
-</file>
-
-<file path=ppt/slides/slide5.xml><?xml version="1.0" encoding="utf-8"?>
-<p:sld xmlns:a="http://schemas.openxmlformats.org/drawingml/2006/main" xmlns:r="http://schemas.openxmlformats.org/officeDocument/2006/relationships" xmlns:p="http://schemas.openxmlformats.org/presentationml/2006/main">
-  <p:cSld>
-    <p:bg>
-      <p:bgPr>
-        <a:gradFill rotWithShape="1">
-          <a:gsLst>
-            <a:gs pos="10000">
-              <a:schemeClr val="bg2">
-                <a:tint val="97000"/>
-                <a:hueMod val="92000"/>
-                <a:satMod val="169000"/>
-                <a:lumMod val="164000"/>
-              </a:schemeClr>
-            </a:gs>
-            <a:gs pos="100000">
-              <a:schemeClr val="bg2">
-                <a:shade val="96000"/>
-                <a:satMod val="120000"/>
-                <a:lumMod val="90000"/>
-              </a:schemeClr>
-            </a:gs>
-          </a:gsLst>
-          <a:lin ang="6120000" scaled="1"/>
-        </a:gradFill>
-        <a:effectLst/>
-      </p:bgPr>
-    </p:bg>
-    <p:spTree>
-      <p:nvGrpSpPr>
-        <p:cNvPr id="1" name=""/>
-        <p:cNvGrpSpPr/>
-        <p:nvPr/>
-      </p:nvGrpSpPr>
-      <p:grpSpPr>
-        <a:xfrm>
-          <a:off x="0" y="0"/>
-          <a:ext cx="0" cy="0"/>
-          <a:chOff x="0" y="0"/>
-          <a:chExt cx="0" cy="0"/>
-        </a:xfrm>
-      </p:grpSpPr>
-      <p:sp>
-        <p:nvSpPr>
-          <p:cNvPr id="2" name="Titel 1">
-            <a:extLst>
-              <a:ext uri="{FF2B5EF4-FFF2-40B4-BE49-F238E27FC236}">
-                <a16:creationId xmlns:a16="http://schemas.microsoft.com/office/drawing/2014/main" id="{4CCE4CD6-0D06-4D3E-9B77-7A5FC9AC4F95}"/>
-              </a:ext>
-            </a:extLst>
-          </p:cNvPr>
-          <p:cNvSpPr>
-            <a:spLocks noGrp="1"/>
-          </p:cNvSpPr>
-          <p:nvPr>
-            <p:ph type="title"/>
-          </p:nvPr>
-        </p:nvSpPr>
-        <p:spPr>
-          <a:xfrm>
-            <a:off x="791239" y="733647"/>
-            <a:ext cx="8534400" cy="1507067"/>
-          </a:xfrm>
-        </p:spPr>
-        <p:txBody>
-          <a:bodyPr>
-            <a:normAutofit/>
-          </a:bodyPr>
-          <a:lstStyle/>
-          <a:p>
-            <a:r>
-              <a:rPr lang="de-CH" dirty="0"/>
-              <a:t>Projekt</a:t>
+              <a:t>Projekt Funktionen</a:t>
             </a:r>
           </a:p>
         </p:txBody>
@@ -7662,7 +7484,7 @@
         </p:nvSpPr>
         <p:spPr>
           <a:xfrm>
-            <a:off x="737726" y="3065323"/>
+            <a:off x="684212" y="2809653"/>
             <a:ext cx="8534400" cy="3615267"/>
           </a:xfrm>
           <a:prstGeom prst="rect">
@@ -7906,6 +7728,12 @@
               <a:t>Ausrechnen aktueller Balance und Status</a:t>
             </a:r>
           </a:p>
+          <a:p>
+            <a:r>
+              <a:rPr lang="de-CH" dirty="0"/>
+              <a:t>Import / Export Funktion</a:t>
+            </a:r>
+          </a:p>
         </p:txBody>
       </p:sp>
     </p:spTree>
@@ -7921,7 +7749,7 @@
 </p:sld>
 </file>
 
-<file path=ppt/slides/slide6.xml><?xml version="1.0" encoding="utf-8"?>
+<file path=ppt/slides/slide5.xml><?xml version="1.0" encoding="utf-8"?>
 <p:sld xmlns:a="http://schemas.openxmlformats.org/drawingml/2006/main" xmlns:r="http://schemas.openxmlformats.org/officeDocument/2006/relationships" xmlns:p="http://schemas.openxmlformats.org/presentationml/2006/main">
   <p:cSld>
     <p:spTree>
@@ -7998,8 +7826,98 @@
         </p:blipFill>
         <p:spPr>
           <a:xfrm>
-            <a:off x="511492" y="2141220"/>
+            <a:off x="770284" y="2336321"/>
             <a:ext cx="9248775" cy="533400"/>
+          </a:xfrm>
+          <a:prstGeom prst="rect">
+            <a:avLst/>
+          </a:prstGeom>
+        </p:spPr>
+      </p:pic>
+      <p:pic>
+        <p:nvPicPr>
+          <p:cNvPr id="4" name="Grafik 3">
+            <a:extLst>
+              <a:ext uri="{FF2B5EF4-FFF2-40B4-BE49-F238E27FC236}">
+                <a16:creationId xmlns:a16="http://schemas.microsoft.com/office/drawing/2014/main" id="{2C392993-E045-4E38-9582-530909F00BF1}"/>
+              </a:ext>
+            </a:extLst>
+          </p:cNvPr>
+          <p:cNvPicPr>
+            <a:picLocks noChangeAspect="1"/>
+          </p:cNvPicPr>
+          <p:nvPr/>
+        </p:nvPicPr>
+        <p:blipFill>
+          <a:blip r:embed="rId3"/>
+          <a:stretch>
+            <a:fillRect/>
+          </a:stretch>
+        </p:blipFill>
+        <p:spPr>
+          <a:xfrm>
+            <a:off x="2751915" y="2869721"/>
+            <a:ext cx="4905375" cy="2219325"/>
+          </a:xfrm>
+          <a:prstGeom prst="rect">
+            <a:avLst/>
+          </a:prstGeom>
+        </p:spPr>
+      </p:pic>
+      <p:pic>
+        <p:nvPicPr>
+          <p:cNvPr id="6" name="Grafik 5">
+            <a:extLst>
+              <a:ext uri="{FF2B5EF4-FFF2-40B4-BE49-F238E27FC236}">
+                <a16:creationId xmlns:a16="http://schemas.microsoft.com/office/drawing/2014/main" id="{2A28F2AD-D0EF-445B-80B6-700C52805174}"/>
+              </a:ext>
+            </a:extLst>
+          </p:cNvPr>
+          <p:cNvPicPr>
+            <a:picLocks noChangeAspect="1"/>
+          </p:cNvPicPr>
+          <p:nvPr/>
+        </p:nvPicPr>
+        <p:blipFill>
+          <a:blip r:embed="rId4"/>
+          <a:stretch>
+            <a:fillRect/>
+          </a:stretch>
+        </p:blipFill>
+        <p:spPr>
+          <a:xfrm>
+            <a:off x="4851833" y="1615729"/>
+            <a:ext cx="705540" cy="705540"/>
+          </a:xfrm>
+          <a:prstGeom prst="rect">
+            <a:avLst/>
+          </a:prstGeom>
+        </p:spPr>
+      </p:pic>
+      <p:pic>
+        <p:nvPicPr>
+          <p:cNvPr id="9" name="Grafik 8">
+            <a:extLst>
+              <a:ext uri="{FF2B5EF4-FFF2-40B4-BE49-F238E27FC236}">
+                <a16:creationId xmlns:a16="http://schemas.microsoft.com/office/drawing/2014/main" id="{ADC8D0E4-BC58-4563-BDB7-FEF17DEA6B31}"/>
+              </a:ext>
+            </a:extLst>
+          </p:cNvPr>
+          <p:cNvPicPr>
+            <a:picLocks noChangeAspect="1"/>
+          </p:cNvPicPr>
+          <p:nvPr/>
+        </p:nvPicPr>
+        <p:blipFill>
+          <a:blip r:embed="rId5"/>
+          <a:stretch>
+            <a:fillRect/>
+          </a:stretch>
+        </p:blipFill>
+        <p:spPr>
+          <a:xfrm>
+            <a:off x="3299353" y="5070651"/>
+            <a:ext cx="3832968" cy="1325917"/>
           </a:xfrm>
           <a:prstGeom prst="rect">
             <a:avLst/>
@@ -8015,6 +7933,806 @@
   </p:cSld>
   <p:clrMapOvr>
     <a:masterClrMapping/>
+  </p:clrMapOvr>
+</p:sld>
+</file>
+
+<file path=ppt/slides/slide6.xml><?xml version="1.0" encoding="utf-8"?>
+<p:sld xmlns:a="http://schemas.openxmlformats.org/drawingml/2006/main" xmlns:r="http://schemas.openxmlformats.org/officeDocument/2006/relationships" xmlns:p="http://schemas.openxmlformats.org/presentationml/2006/main">
+  <p:cSld>
+    <p:bg>
+      <p:bgPr>
+        <a:solidFill>
+          <a:schemeClr val="bg1"/>
+        </a:solidFill>
+        <a:effectLst/>
+      </p:bgPr>
+    </p:bg>
+    <p:spTree>
+      <p:nvGrpSpPr>
+        <p:cNvPr id="1" name=""/>
+        <p:cNvGrpSpPr/>
+        <p:nvPr/>
+      </p:nvGrpSpPr>
+      <p:grpSpPr>
+        <a:xfrm>
+          <a:off x="0" y="0"/>
+          <a:ext cx="0" cy="0"/>
+          <a:chOff x="0" y="0"/>
+          <a:chExt cx="0" cy="0"/>
+        </a:xfrm>
+      </p:grpSpPr>
+      <p:cxnSp>
+        <p:nvCxnSpPr>
+          <p:cNvPr id="10" name="Straight Connector 9">
+            <a:extLst>
+              <a:ext uri="{FF2B5EF4-FFF2-40B4-BE49-F238E27FC236}">
+                <a16:creationId xmlns:a16="http://schemas.microsoft.com/office/drawing/2014/main" id="{0512F9CB-A1A0-4043-A103-F6A4B94B695A}"/>
+              </a:ext>
+              <a:ext uri="{C183D7F6-B498-43B3-948B-1728B52AA6E4}">
+                <adec:decorative xmlns:adec="http://schemas.microsoft.com/office/drawing/2017/decorative" val="1"/>
+              </a:ext>
+            </a:extLst>
+          </p:cNvPr>
+          <p:cNvCxnSpPr>
+            <a:cxnSpLocks noGrp="1" noRot="1" noChangeAspect="1" noMove="1" noResize="1" noEditPoints="1" noAdjustHandles="1" noChangeArrowheads="1" noChangeShapeType="1"/>
+          </p:cNvCxnSpPr>
+          <p:nvPr>
+            <p:extLst>
+              <p:ext uri="{386F3935-93C4-4BCD-93E2-E3B085C9AB24}">
+                <p16:designElem xmlns:p16="http://schemas.microsoft.com/office/powerpoint/2015/main" val="1"/>
+              </p:ext>
+            </p:extLst>
+          </p:nvPr>
+        </p:nvCxnSpPr>
+        <p:spPr>
+          <a:xfrm flipH="1">
+            <a:off x="8228012" y="8467"/>
+            <a:ext cx="3810000" cy="3810000"/>
+          </a:xfrm>
+          <a:prstGeom prst="line">
+            <a:avLst/>
+          </a:prstGeom>
+          <a:ln w="12700">
+            <a:solidFill>
+              <a:schemeClr val="tx1"/>
+            </a:solidFill>
+          </a:ln>
+        </p:spPr>
+        <p:style>
+          <a:lnRef idx="2">
+            <a:schemeClr val="accent1"/>
+          </a:lnRef>
+          <a:fillRef idx="0">
+            <a:schemeClr val="accent1"/>
+          </a:fillRef>
+          <a:effectRef idx="1">
+            <a:schemeClr val="accent1"/>
+          </a:effectRef>
+          <a:fontRef idx="minor">
+            <a:schemeClr val="tx1"/>
+          </a:fontRef>
+        </p:style>
+      </p:cxnSp>
+      <p:cxnSp>
+        <p:nvCxnSpPr>
+          <p:cNvPr id="12" name="Straight Connector 11">
+            <a:extLst>
+              <a:ext uri="{FF2B5EF4-FFF2-40B4-BE49-F238E27FC236}">
+                <a16:creationId xmlns:a16="http://schemas.microsoft.com/office/drawing/2014/main" id="{ADBE6588-EE16-4389-857C-86A156D49E5D}"/>
+              </a:ext>
+              <a:ext uri="{C183D7F6-B498-43B3-948B-1728B52AA6E4}">
+                <adec:decorative xmlns:adec="http://schemas.microsoft.com/office/drawing/2017/decorative" val="1"/>
+              </a:ext>
+            </a:extLst>
+          </p:cNvPr>
+          <p:cNvCxnSpPr>
+            <a:cxnSpLocks noGrp="1" noRot="1" noChangeAspect="1" noMove="1" noResize="1" noEditPoints="1" noAdjustHandles="1" noChangeArrowheads="1" noChangeShapeType="1"/>
+          </p:cNvCxnSpPr>
+          <p:nvPr>
+            <p:extLst>
+              <p:ext uri="{386F3935-93C4-4BCD-93E2-E3B085C9AB24}">
+                <p16:designElem xmlns:p16="http://schemas.microsoft.com/office/powerpoint/2015/main" val="1"/>
+              </p:ext>
+            </p:extLst>
+          </p:nvPr>
+        </p:nvCxnSpPr>
+        <p:spPr>
+          <a:xfrm flipH="1">
+            <a:off x="6108170" y="91545"/>
+            <a:ext cx="6080655" cy="6080655"/>
+          </a:xfrm>
+          <a:prstGeom prst="line">
+            <a:avLst/>
+          </a:prstGeom>
+          <a:ln w="12700">
+            <a:solidFill>
+              <a:schemeClr val="tx1"/>
+            </a:solidFill>
+          </a:ln>
+        </p:spPr>
+        <p:style>
+          <a:lnRef idx="2">
+            <a:schemeClr val="accent1"/>
+          </a:lnRef>
+          <a:fillRef idx="0">
+            <a:schemeClr val="accent1"/>
+          </a:fillRef>
+          <a:effectRef idx="1">
+            <a:schemeClr val="accent1"/>
+          </a:effectRef>
+          <a:fontRef idx="minor">
+            <a:schemeClr val="tx1"/>
+          </a:fontRef>
+        </p:style>
+      </p:cxnSp>
+      <p:cxnSp>
+        <p:nvCxnSpPr>
+          <p:cNvPr id="14" name="Straight Connector 13">
+            <a:extLst>
+              <a:ext uri="{FF2B5EF4-FFF2-40B4-BE49-F238E27FC236}">
+                <a16:creationId xmlns:a16="http://schemas.microsoft.com/office/drawing/2014/main" id="{17FD48D2-B0A7-413D-B947-AA55AC1296D5}"/>
+              </a:ext>
+              <a:ext uri="{C183D7F6-B498-43B3-948B-1728B52AA6E4}">
+                <adec:decorative xmlns:adec="http://schemas.microsoft.com/office/drawing/2017/decorative" val="1"/>
+              </a:ext>
+            </a:extLst>
+          </p:cNvPr>
+          <p:cNvCxnSpPr>
+            <a:cxnSpLocks noGrp="1" noRot="1" noChangeAspect="1" noMove="1" noResize="1" noEditPoints="1" noAdjustHandles="1" noChangeArrowheads="1" noChangeShapeType="1"/>
+          </p:cNvCxnSpPr>
+          <p:nvPr>
+            <p:extLst>
+              <p:ext uri="{386F3935-93C4-4BCD-93E2-E3B085C9AB24}">
+                <p16:designElem xmlns:p16="http://schemas.microsoft.com/office/powerpoint/2015/main" val="1"/>
+              </p:ext>
+            </p:extLst>
+          </p:nvPr>
+        </p:nvCxnSpPr>
+        <p:spPr>
+          <a:xfrm flipH="1">
+            <a:off x="7235825" y="228600"/>
+            <a:ext cx="4953000" cy="4953000"/>
+          </a:xfrm>
+          <a:prstGeom prst="line">
+            <a:avLst/>
+          </a:prstGeom>
+          <a:ln w="12700">
+            <a:solidFill>
+              <a:schemeClr val="tx1"/>
+            </a:solidFill>
+          </a:ln>
+        </p:spPr>
+        <p:style>
+          <a:lnRef idx="2">
+            <a:schemeClr val="accent1"/>
+          </a:lnRef>
+          <a:fillRef idx="0">
+            <a:schemeClr val="accent1"/>
+          </a:fillRef>
+          <a:effectRef idx="1">
+            <a:schemeClr val="accent1"/>
+          </a:effectRef>
+          <a:fontRef idx="minor">
+            <a:schemeClr val="tx1"/>
+          </a:fontRef>
+        </p:style>
+      </p:cxnSp>
+      <p:cxnSp>
+        <p:nvCxnSpPr>
+          <p:cNvPr id="16" name="Straight Connector 15">
+            <a:extLst>
+              <a:ext uri="{FF2B5EF4-FFF2-40B4-BE49-F238E27FC236}">
+                <a16:creationId xmlns:a16="http://schemas.microsoft.com/office/drawing/2014/main" id="{2BE668D0-D906-4EEE-B32F-8C028624B837}"/>
+              </a:ext>
+              <a:ext uri="{C183D7F6-B498-43B3-948B-1728B52AA6E4}">
+                <adec:decorative xmlns:adec="http://schemas.microsoft.com/office/drawing/2017/decorative" val="1"/>
+              </a:ext>
+            </a:extLst>
+          </p:cNvPr>
+          <p:cNvCxnSpPr>
+            <a:cxnSpLocks noGrp="1" noRot="1" noChangeAspect="1" noMove="1" noResize="1" noEditPoints="1" noAdjustHandles="1" noChangeArrowheads="1" noChangeShapeType="1"/>
+          </p:cNvCxnSpPr>
+          <p:nvPr>
+            <p:extLst>
+              <p:ext uri="{386F3935-93C4-4BCD-93E2-E3B085C9AB24}">
+                <p16:designElem xmlns:p16="http://schemas.microsoft.com/office/powerpoint/2015/main" val="1"/>
+              </p:ext>
+            </p:extLst>
+          </p:nvPr>
+        </p:nvCxnSpPr>
+        <p:spPr>
+          <a:xfrm flipH="1">
+            <a:off x="7335837" y="32278"/>
+            <a:ext cx="4852989" cy="4852989"/>
+          </a:xfrm>
+          <a:prstGeom prst="line">
+            <a:avLst/>
+          </a:prstGeom>
+          <a:ln w="31750">
+            <a:solidFill>
+              <a:schemeClr val="tx1"/>
+            </a:solidFill>
+          </a:ln>
+        </p:spPr>
+        <p:style>
+          <a:lnRef idx="2">
+            <a:schemeClr val="accent1"/>
+          </a:lnRef>
+          <a:fillRef idx="0">
+            <a:schemeClr val="accent1"/>
+          </a:fillRef>
+          <a:effectRef idx="1">
+            <a:schemeClr val="accent1"/>
+          </a:effectRef>
+          <a:fontRef idx="minor">
+            <a:schemeClr val="tx1"/>
+          </a:fontRef>
+        </p:style>
+      </p:cxnSp>
+      <p:cxnSp>
+        <p:nvCxnSpPr>
+          <p:cNvPr id="18" name="Straight Connector 17">
+            <a:extLst>
+              <a:ext uri="{FF2B5EF4-FFF2-40B4-BE49-F238E27FC236}">
+                <a16:creationId xmlns:a16="http://schemas.microsoft.com/office/drawing/2014/main" id="{D1DE67A3-B8F6-4CFD-A8E0-D15200F23152}"/>
+              </a:ext>
+              <a:ext uri="{C183D7F6-B498-43B3-948B-1728B52AA6E4}">
+                <adec:decorative xmlns:adec="http://schemas.microsoft.com/office/drawing/2017/decorative" val="1"/>
+              </a:ext>
+            </a:extLst>
+          </p:cNvPr>
+          <p:cNvCxnSpPr>
+            <a:cxnSpLocks noGrp="1" noRot="1" noChangeAspect="1" noMove="1" noResize="1" noEditPoints="1" noAdjustHandles="1" noChangeArrowheads="1" noChangeShapeType="1"/>
+          </p:cNvCxnSpPr>
+          <p:nvPr>
+            <p:extLst>
+              <p:ext uri="{386F3935-93C4-4BCD-93E2-E3B085C9AB24}">
+                <p16:designElem xmlns:p16="http://schemas.microsoft.com/office/powerpoint/2015/main" val="1"/>
+              </p:ext>
+            </p:extLst>
+          </p:nvPr>
+        </p:nvCxnSpPr>
+        <p:spPr>
+          <a:xfrm flipH="1">
+            <a:off x="7845426" y="609601"/>
+            <a:ext cx="4343399" cy="4343399"/>
+          </a:xfrm>
+          <a:prstGeom prst="line">
+            <a:avLst/>
+          </a:prstGeom>
+          <a:ln w="31750">
+            <a:solidFill>
+              <a:schemeClr val="tx1"/>
+            </a:solidFill>
+          </a:ln>
+        </p:spPr>
+        <p:style>
+          <a:lnRef idx="2">
+            <a:schemeClr val="accent1"/>
+          </a:lnRef>
+          <a:fillRef idx="0">
+            <a:schemeClr val="accent1"/>
+          </a:fillRef>
+          <a:effectRef idx="1">
+            <a:schemeClr val="accent1"/>
+          </a:effectRef>
+          <a:fontRef idx="minor">
+            <a:schemeClr val="tx1"/>
+          </a:fontRef>
+        </p:style>
+      </p:cxnSp>
+      <p:sp>
+        <p:nvSpPr>
+          <p:cNvPr id="20" name="Rectangle 19">
+            <a:extLst>
+              <a:ext uri="{FF2B5EF4-FFF2-40B4-BE49-F238E27FC236}">
+                <a16:creationId xmlns:a16="http://schemas.microsoft.com/office/drawing/2014/main" id="{991E317B-75E3-4171-A07A-B263C1D6DCA5}"/>
+              </a:ext>
+              <a:ext uri="{C183D7F6-B498-43B3-948B-1728B52AA6E4}">
+                <adec:decorative xmlns:adec="http://schemas.microsoft.com/office/drawing/2017/decorative" val="1"/>
+              </a:ext>
+            </a:extLst>
+          </p:cNvPr>
+          <p:cNvSpPr>
+            <a:spLocks noGrp="1" noRot="1" noChangeAspect="1" noMove="1" noResize="1" noEditPoints="1" noAdjustHandles="1" noChangeArrowheads="1" noChangeShapeType="1" noTextEdit="1"/>
+          </p:cNvSpPr>
+          <p:nvPr>
+            <p:extLst>
+              <p:ext uri="{386F3935-93C4-4BCD-93E2-E3B085C9AB24}">
+                <p16:designElem xmlns:p16="http://schemas.microsoft.com/office/powerpoint/2015/main" val="1"/>
+              </p:ext>
+            </p:extLst>
+          </p:nvPr>
+        </p:nvSpPr>
+        <p:spPr>
+          <a:xfrm>
+            <a:off x="0" y="0"/>
+            <a:ext cx="12192000" cy="6858000"/>
+          </a:xfrm>
+          <a:prstGeom prst="rect">
+            <a:avLst/>
+          </a:prstGeom>
+          <a:ln>
+            <a:noFill/>
+          </a:ln>
+        </p:spPr>
+        <p:style>
+          <a:lnRef idx="2">
+            <a:schemeClr val="accent1">
+              <a:shade val="50000"/>
+            </a:schemeClr>
+          </a:lnRef>
+          <a:fillRef idx="1002">
+            <a:schemeClr val="dk2"/>
+          </a:fillRef>
+          <a:effectRef idx="0">
+            <a:schemeClr val="accent1"/>
+          </a:effectRef>
+          <a:fontRef idx="minor">
+            <a:schemeClr val="lt1"/>
+          </a:fontRef>
+        </p:style>
+        <p:txBody>
+          <a:bodyPr rtlCol="0" anchor="ctr"/>
+          <a:lstStyle/>
+          <a:p>
+            <a:pPr algn="ctr"/>
+            <a:endParaRPr lang="en-US"/>
+          </a:p>
+        </p:txBody>
+      </p:sp>
+      <p:sp>
+        <p:nvSpPr>
+          <p:cNvPr id="2" name="Titel 1">
+            <a:extLst>
+              <a:ext uri="{FF2B5EF4-FFF2-40B4-BE49-F238E27FC236}">
+                <a16:creationId xmlns:a16="http://schemas.microsoft.com/office/drawing/2014/main" id="{3380C3EF-010D-49BB-9581-0CC427D9835F}"/>
+              </a:ext>
+            </a:extLst>
+          </p:cNvPr>
+          <p:cNvSpPr>
+            <a:spLocks noGrp="1"/>
+          </p:cNvSpPr>
+          <p:nvPr>
+            <p:ph type="title"/>
+          </p:nvPr>
+        </p:nvSpPr>
+        <p:spPr>
+          <a:xfrm>
+            <a:off x="7532709" y="628617"/>
+            <a:ext cx="4161985" cy="3028983"/>
+          </a:xfrm>
+        </p:spPr>
+        <p:txBody>
+          <a:bodyPr vert="horz" lIns="91440" tIns="45720" rIns="91440" bIns="45720" rtlCol="0" anchor="b">
+            <a:normAutofit/>
+          </a:bodyPr>
+          <a:lstStyle/>
+          <a:p>
+            <a:r>
+              <a:rPr lang="en-US" sz="4800" dirty="0" err="1">
+                <a:solidFill>
+                  <a:srgbClr val="FFFFFF"/>
+                </a:solidFill>
+              </a:rPr>
+              <a:t>ProjekT</a:t>
+            </a:r>
+            <a:r>
+              <a:rPr lang="en-US" sz="4800" dirty="0">
+                <a:solidFill>
+                  <a:srgbClr val="FFFFFF"/>
+                </a:solidFill>
+              </a:rPr>
+              <a:t> </a:t>
+            </a:r>
+            <a:r>
+              <a:rPr lang="en-US" sz="4800" dirty="0" err="1">
+                <a:solidFill>
+                  <a:srgbClr val="FFFFFF"/>
+                </a:solidFill>
+              </a:rPr>
+              <a:t>architektur</a:t>
+            </a:r>
+            <a:endParaRPr lang="en-US" sz="4800" dirty="0">
+              <a:solidFill>
+                <a:srgbClr val="FFFFFF"/>
+              </a:solidFill>
+            </a:endParaRPr>
+          </a:p>
+        </p:txBody>
+      </p:sp>
+      <p:sp useBgFill="1">
+        <p:nvSpPr>
+          <p:cNvPr id="22" name="Snip Diagonal Corner Rectangle 6">
+            <a:extLst>
+              <a:ext uri="{FF2B5EF4-FFF2-40B4-BE49-F238E27FC236}">
+                <a16:creationId xmlns:a16="http://schemas.microsoft.com/office/drawing/2014/main" id="{4A9B19C2-B29A-4924-9E7E-6FBF17F5854E}"/>
+              </a:ext>
+              <a:ext uri="{C183D7F6-B498-43B3-948B-1728B52AA6E4}">
+                <adec:decorative xmlns:adec="http://schemas.microsoft.com/office/drawing/2017/decorative" val="1"/>
+              </a:ext>
+            </a:extLst>
+          </p:cNvPr>
+          <p:cNvSpPr>
+            <a:spLocks noGrp="1" noRot="1" noChangeAspect="1" noMove="1" noResize="1" noEditPoints="1" noAdjustHandles="1" noChangeArrowheads="1" noChangeShapeType="1" noTextEdit="1"/>
+          </p:cNvSpPr>
+          <p:nvPr>
+            <p:extLst>
+              <p:ext uri="{386F3935-93C4-4BCD-93E2-E3B085C9AB24}">
+                <p16:designElem xmlns:p16="http://schemas.microsoft.com/office/powerpoint/2015/main" val="1"/>
+              </p:ext>
+            </p:extLst>
+          </p:nvPr>
+        </p:nvSpPr>
+        <p:spPr>
+          <a:xfrm>
+            <a:off x="634000" y="620722"/>
+            <a:ext cx="6418778" cy="5286838"/>
+          </a:xfrm>
+          <a:prstGeom prst="snip2DiagRect">
+            <a:avLst>
+              <a:gd name="adj1" fmla="val 10973"/>
+              <a:gd name="adj2" fmla="val 0"/>
+            </a:avLst>
+          </a:prstGeom>
+          <a:ln>
+            <a:noFill/>
+          </a:ln>
+          <a:effectLst>
+            <a:innerShdw blurRad="57150" dist="38100" dir="14460000">
+              <a:prstClr val="black">
+                <a:alpha val="70000"/>
+              </a:prstClr>
+            </a:innerShdw>
+          </a:effectLst>
+        </p:spPr>
+        <p:style>
+          <a:lnRef idx="2">
+            <a:schemeClr val="accent1">
+              <a:shade val="50000"/>
+            </a:schemeClr>
+          </a:lnRef>
+          <a:fillRef idx="1">
+            <a:schemeClr val="accent1"/>
+          </a:fillRef>
+          <a:effectRef idx="0">
+            <a:schemeClr val="accent1"/>
+          </a:effectRef>
+          <a:fontRef idx="minor">
+            <a:schemeClr val="lt1"/>
+          </a:fontRef>
+        </p:style>
+        <p:txBody>
+          <a:bodyPr rtlCol="0" anchor="ctr"/>
+          <a:lstStyle/>
+          <a:p>
+            <a:pPr algn="ctr"/>
+            <a:endParaRPr lang="en-US"/>
+          </a:p>
+        </p:txBody>
+      </p:sp>
+      <p:pic>
+        <p:nvPicPr>
+          <p:cNvPr id="5" name="Grafik 4">
+            <a:extLst>
+              <a:ext uri="{FF2B5EF4-FFF2-40B4-BE49-F238E27FC236}">
+                <a16:creationId xmlns:a16="http://schemas.microsoft.com/office/drawing/2014/main" id="{9D56CBBB-22C8-4315-B9EF-84DF05CFBF31}"/>
+              </a:ext>
+            </a:extLst>
+          </p:cNvPr>
+          <p:cNvPicPr>
+            <a:picLocks noChangeAspect="1"/>
+          </p:cNvPicPr>
+          <p:nvPr/>
+        </p:nvPicPr>
+        <p:blipFill>
+          <a:blip r:embed="rId2"/>
+          <a:stretch>
+            <a:fillRect/>
+          </a:stretch>
+        </p:blipFill>
+        <p:spPr>
+          <a:xfrm>
+            <a:off x="1101217" y="1220227"/>
+            <a:ext cx="5450437" cy="4087827"/>
+          </a:xfrm>
+          <a:prstGeom prst="rect">
+            <a:avLst/>
+          </a:prstGeom>
+        </p:spPr>
+      </p:pic>
+      <p:grpSp>
+        <p:nvGrpSpPr>
+          <p:cNvPr id="24" name="Group 23">
+            <a:extLst>
+              <a:ext uri="{FF2B5EF4-FFF2-40B4-BE49-F238E27FC236}">
+                <a16:creationId xmlns:a16="http://schemas.microsoft.com/office/drawing/2014/main" id="{34C85634-D5F5-4047-8F35-F4B1F50AB1A7}"/>
+              </a:ext>
+              <a:ext uri="{C183D7F6-B498-43B3-948B-1728B52AA6E4}">
+                <adec:decorative xmlns:adec="http://schemas.microsoft.com/office/drawing/2017/decorative" val="1"/>
+              </a:ext>
+            </a:extLst>
+          </p:cNvPr>
+          <p:cNvGrpSpPr>
+            <a:grpSpLocks noGrp="1" noUngrp="1" noRot="1" noChangeAspect="1" noMove="1" noResize="1"/>
+          </p:cNvGrpSpPr>
+          <p:nvPr>
+            <p:extLst>
+              <p:ext uri="{386F3935-93C4-4BCD-93E2-E3B085C9AB24}">
+                <p16:designElem xmlns:p16="http://schemas.microsoft.com/office/powerpoint/2015/main" val="1"/>
+              </p:ext>
+            </p:extLst>
+          </p:nvPr>
+        </p:nvGrpSpPr>
+        <p:grpSpPr>
+          <a:xfrm>
+            <a:off x="9206969" y="2963333"/>
+            <a:ext cx="2981858" cy="3208867"/>
+            <a:chOff x="9206969" y="2963333"/>
+            <a:chExt cx="2981858" cy="3208867"/>
+          </a:xfrm>
+        </p:grpSpPr>
+        <p:cxnSp>
+          <p:nvCxnSpPr>
+            <p:cNvPr id="25" name="Straight Connector 24">
+              <a:extLst>
+                <a:ext uri="{FF2B5EF4-FFF2-40B4-BE49-F238E27FC236}">
+                  <a16:creationId xmlns:a16="http://schemas.microsoft.com/office/drawing/2014/main" id="{1224BF71-948F-411D-AA79-8B2315715197}"/>
+                </a:ext>
+                <a:ext uri="{C183D7F6-B498-43B3-948B-1728B52AA6E4}">
+                  <adec:decorative xmlns:adec="http://schemas.microsoft.com/office/drawing/2017/decorative" val="1"/>
+                </a:ext>
+              </a:extLst>
+            </p:cNvPr>
+            <p:cNvCxnSpPr/>
+            <p:nvPr>
+              <p:extLst>
+                <p:ext uri="{386F3935-93C4-4BCD-93E2-E3B085C9AB24}">
+                  <p16:designElem xmlns:p16="http://schemas.microsoft.com/office/powerpoint/2015/main" val="1"/>
+                </p:ext>
+              </p:extLst>
+            </p:nvPr>
+          </p:nvCxnSpPr>
+          <p:spPr>
+            <a:xfrm flipH="1">
+              <a:off x="11276012" y="2963333"/>
+              <a:ext cx="912814" cy="912812"/>
+            </a:xfrm>
+            <a:prstGeom prst="line">
+              <a:avLst/>
+            </a:prstGeom>
+            <a:ln w="9525">
+              <a:solidFill>
+                <a:srgbClr val="FFFFFF"/>
+              </a:solidFill>
+            </a:ln>
+          </p:spPr>
+          <p:style>
+            <a:lnRef idx="2">
+              <a:schemeClr val="accent1"/>
+            </a:lnRef>
+            <a:fillRef idx="0">
+              <a:schemeClr val="accent1"/>
+            </a:fillRef>
+            <a:effectRef idx="1">
+              <a:schemeClr val="accent1"/>
+            </a:effectRef>
+            <a:fontRef idx="minor">
+              <a:schemeClr val="tx1"/>
+            </a:fontRef>
+          </p:style>
+        </p:cxnSp>
+        <p:cxnSp>
+          <p:nvCxnSpPr>
+            <p:cNvPr id="26" name="Straight Connector 25">
+              <a:extLst>
+                <a:ext uri="{FF2B5EF4-FFF2-40B4-BE49-F238E27FC236}">
+                  <a16:creationId xmlns:a16="http://schemas.microsoft.com/office/drawing/2014/main" id="{434B4526-E715-4199-A597-CD757CB4A026}"/>
+                </a:ext>
+                <a:ext uri="{C183D7F6-B498-43B3-948B-1728B52AA6E4}">
+                  <adec:decorative xmlns:adec="http://schemas.microsoft.com/office/drawing/2017/decorative" val="1"/>
+                </a:ext>
+              </a:extLst>
+            </p:cNvPr>
+            <p:cNvCxnSpPr/>
+            <p:nvPr>
+              <p:extLst>
+                <p:ext uri="{386F3935-93C4-4BCD-93E2-E3B085C9AB24}">
+                  <p16:designElem xmlns:p16="http://schemas.microsoft.com/office/powerpoint/2015/main" val="1"/>
+                </p:ext>
+              </p:extLst>
+            </p:nvPr>
+          </p:nvCxnSpPr>
+          <p:spPr>
+            <a:xfrm flipH="1">
+              <a:off x="9206969" y="3190344"/>
+              <a:ext cx="2981857" cy="2981856"/>
+            </a:xfrm>
+            <a:prstGeom prst="line">
+              <a:avLst/>
+            </a:prstGeom>
+            <a:ln w="9525">
+              <a:solidFill>
+                <a:srgbClr val="FFFFFF"/>
+              </a:solidFill>
+            </a:ln>
+          </p:spPr>
+          <p:style>
+            <a:lnRef idx="2">
+              <a:schemeClr val="accent1"/>
+            </a:lnRef>
+            <a:fillRef idx="0">
+              <a:schemeClr val="accent1"/>
+            </a:fillRef>
+            <a:effectRef idx="1">
+              <a:schemeClr val="accent1"/>
+            </a:effectRef>
+            <a:fontRef idx="minor">
+              <a:schemeClr val="tx1"/>
+            </a:fontRef>
+          </p:style>
+        </p:cxnSp>
+        <p:cxnSp>
+          <p:nvCxnSpPr>
+            <p:cNvPr id="27" name="Straight Connector 26">
+              <a:extLst>
+                <a:ext uri="{FF2B5EF4-FFF2-40B4-BE49-F238E27FC236}">
+                  <a16:creationId xmlns:a16="http://schemas.microsoft.com/office/drawing/2014/main" id="{35E295A6-48D5-4F9E-A32C-5D87EAA5E7E7}"/>
+                </a:ext>
+                <a:ext uri="{C183D7F6-B498-43B3-948B-1728B52AA6E4}">
+                  <adec:decorative xmlns:adec="http://schemas.microsoft.com/office/drawing/2017/decorative" val="1"/>
+                </a:ext>
+              </a:extLst>
+            </p:cNvPr>
+            <p:cNvCxnSpPr/>
+            <p:nvPr>
+              <p:extLst>
+                <p:ext uri="{386F3935-93C4-4BCD-93E2-E3B085C9AB24}">
+                  <p16:designElem xmlns:p16="http://schemas.microsoft.com/office/powerpoint/2015/main" val="1"/>
+                </p:ext>
+              </p:extLst>
+            </p:nvPr>
+          </p:nvCxnSpPr>
+          <p:spPr>
+            <a:xfrm flipH="1">
+              <a:off x="10292292" y="3285067"/>
+              <a:ext cx="1896534" cy="1896533"/>
+            </a:xfrm>
+            <a:prstGeom prst="line">
+              <a:avLst/>
+            </a:prstGeom>
+            <a:ln w="9525">
+              <a:solidFill>
+                <a:srgbClr val="FFFFFF"/>
+              </a:solidFill>
+            </a:ln>
+          </p:spPr>
+          <p:style>
+            <a:lnRef idx="2">
+              <a:schemeClr val="accent1"/>
+            </a:lnRef>
+            <a:fillRef idx="0">
+              <a:schemeClr val="accent1"/>
+            </a:fillRef>
+            <a:effectRef idx="1">
+              <a:schemeClr val="accent1"/>
+            </a:effectRef>
+            <a:fontRef idx="minor">
+              <a:schemeClr val="tx1"/>
+            </a:fontRef>
+          </p:style>
+        </p:cxnSp>
+        <p:cxnSp>
+          <p:nvCxnSpPr>
+            <p:cNvPr id="28" name="Straight Connector 27">
+              <a:extLst>
+                <a:ext uri="{FF2B5EF4-FFF2-40B4-BE49-F238E27FC236}">
+                  <a16:creationId xmlns:a16="http://schemas.microsoft.com/office/drawing/2014/main" id="{E10BF5B3-9260-4D36-BB24-07BC414B9D49}"/>
+                </a:ext>
+                <a:ext uri="{C183D7F6-B498-43B3-948B-1728B52AA6E4}">
+                  <adec:decorative xmlns:adec="http://schemas.microsoft.com/office/drawing/2017/decorative" val="1"/>
+                </a:ext>
+              </a:extLst>
+            </p:cNvPr>
+            <p:cNvCxnSpPr/>
+            <p:nvPr>
+              <p:extLst>
+                <p:ext uri="{386F3935-93C4-4BCD-93E2-E3B085C9AB24}">
+                  <p16:designElem xmlns:p16="http://schemas.microsoft.com/office/powerpoint/2015/main" val="1"/>
+                </p:ext>
+              </p:extLst>
+            </p:nvPr>
+          </p:nvCxnSpPr>
+          <p:spPr>
+            <a:xfrm flipH="1">
+              <a:off x="10443103" y="3131080"/>
+              <a:ext cx="1745722" cy="1745720"/>
+            </a:xfrm>
+            <a:prstGeom prst="line">
+              <a:avLst/>
+            </a:prstGeom>
+            <a:ln w="28575">
+              <a:solidFill>
+                <a:srgbClr val="FFFFFF"/>
+              </a:solidFill>
+            </a:ln>
+          </p:spPr>
+          <p:style>
+            <a:lnRef idx="2">
+              <a:schemeClr val="accent1"/>
+            </a:lnRef>
+            <a:fillRef idx="0">
+              <a:schemeClr val="accent1"/>
+            </a:fillRef>
+            <a:effectRef idx="1">
+              <a:schemeClr val="accent1"/>
+            </a:effectRef>
+            <a:fontRef idx="minor">
+              <a:schemeClr val="tx1"/>
+            </a:fontRef>
+          </p:style>
+        </p:cxnSp>
+        <p:cxnSp>
+          <p:nvCxnSpPr>
+            <p:cNvPr id="29" name="Straight Connector 28">
+              <a:extLst>
+                <a:ext uri="{FF2B5EF4-FFF2-40B4-BE49-F238E27FC236}">
+                  <a16:creationId xmlns:a16="http://schemas.microsoft.com/office/drawing/2014/main" id="{AAE0C886-FA2E-4E7C-BC00-8397AAEC865E}"/>
+                </a:ext>
+                <a:ext uri="{C183D7F6-B498-43B3-948B-1728B52AA6E4}">
+                  <adec:decorative xmlns:adec="http://schemas.microsoft.com/office/drawing/2017/decorative" val="1"/>
+                </a:ext>
+              </a:extLst>
+            </p:cNvPr>
+            <p:cNvCxnSpPr/>
+            <p:nvPr>
+              <p:extLst>
+                <p:ext uri="{386F3935-93C4-4BCD-93E2-E3B085C9AB24}">
+                  <p16:designElem xmlns:p16="http://schemas.microsoft.com/office/powerpoint/2015/main" val="1"/>
+                </p:ext>
+              </p:extLst>
+            </p:nvPr>
+          </p:nvCxnSpPr>
+          <p:spPr>
+            <a:xfrm flipH="1">
+              <a:off x="10918826" y="3683001"/>
+              <a:ext cx="1270001" cy="1269999"/>
+            </a:xfrm>
+            <a:prstGeom prst="line">
+              <a:avLst/>
+            </a:prstGeom>
+            <a:ln w="28575">
+              <a:solidFill>
+                <a:srgbClr val="FFFFFF"/>
+              </a:solidFill>
+            </a:ln>
+          </p:spPr>
+          <p:style>
+            <a:lnRef idx="2">
+              <a:schemeClr val="accent1"/>
+            </a:lnRef>
+            <a:fillRef idx="0">
+              <a:schemeClr val="accent1"/>
+            </a:fillRef>
+            <a:effectRef idx="1">
+              <a:schemeClr val="accent1"/>
+            </a:effectRef>
+            <a:fontRef idx="minor">
+              <a:schemeClr val="tx1"/>
+            </a:fontRef>
+          </p:style>
+        </p:cxnSp>
+      </p:grpSp>
+    </p:spTree>
+    <p:extLst>
+      <p:ext uri="{BB962C8B-B14F-4D97-AF65-F5344CB8AC3E}">
+        <p14:creationId xmlns:p14="http://schemas.microsoft.com/office/powerpoint/2010/main" val="3336643326"/>
+      </p:ext>
+    </p:extLst>
+  </p:cSld>
+  <p:clrMapOvr>
+    <a:overrideClrMapping bg1="lt1" tx1="dk1" bg2="lt2" tx2="dk2" accent1="accent1" accent2="accent2" accent3="accent3" accent4="accent4" accent5="accent5" accent6="accent6" hlink="hlink" folHlink="folHlink"/>
   </p:clrMapOvr>
 </p:sld>
 </file>
@@ -8593,248 +9311,6 @@
 </file>
 
 <file path=ppt/slides/slide8.xml><?xml version="1.0" encoding="utf-8"?>
-<p:sld xmlns:a="http://schemas.openxmlformats.org/drawingml/2006/main" xmlns:r="http://schemas.openxmlformats.org/officeDocument/2006/relationships" xmlns:p="http://schemas.openxmlformats.org/presentationml/2006/main">
-  <p:cSld>
-    <p:spTree>
-      <p:nvGrpSpPr>
-        <p:cNvPr id="1" name=""/>
-        <p:cNvGrpSpPr/>
-        <p:nvPr/>
-      </p:nvGrpSpPr>
-      <p:grpSpPr>
-        <a:xfrm>
-          <a:off x="0" y="0"/>
-          <a:ext cx="0" cy="0"/>
-          <a:chOff x="0" y="0"/>
-          <a:chExt cx="0" cy="0"/>
-        </a:xfrm>
-      </p:grpSpPr>
-      <p:sp>
-        <p:nvSpPr>
-          <p:cNvPr id="2" name="Titel 1">
-            <a:extLst>
-              <a:ext uri="{FF2B5EF4-FFF2-40B4-BE49-F238E27FC236}">
-                <a16:creationId xmlns:a16="http://schemas.microsoft.com/office/drawing/2014/main" id="{3380C3EF-010D-49BB-9581-0CC427D9835F}"/>
-              </a:ext>
-            </a:extLst>
-          </p:cNvPr>
-          <p:cNvSpPr>
-            <a:spLocks noGrp="1"/>
-          </p:cNvSpPr>
-          <p:nvPr>
-            <p:ph type="title"/>
-          </p:nvPr>
-        </p:nvSpPr>
-        <p:spPr>
-          <a:xfrm>
-            <a:off x="722312" y="461432"/>
-            <a:ext cx="8534400" cy="1507067"/>
-          </a:xfrm>
-        </p:spPr>
-        <p:txBody>
-          <a:bodyPr/>
-          <a:lstStyle/>
-          <a:p>
-            <a:r>
-              <a:rPr lang="de-CH" dirty="0" err="1"/>
-              <a:t>Testing</a:t>
-            </a:r>
-            <a:r>
-              <a:rPr lang="de-CH" dirty="0"/>
-              <a:t>/Fazit</a:t>
-            </a:r>
-            <a:endParaRPr lang="en-US" dirty="0"/>
-          </a:p>
-        </p:txBody>
-      </p:sp>
-      <p:sp>
-        <p:nvSpPr>
-          <p:cNvPr id="6" name="TextBox 5">
-            <a:extLst>
-              <a:ext uri="{FF2B5EF4-FFF2-40B4-BE49-F238E27FC236}">
-                <a16:creationId xmlns:a16="http://schemas.microsoft.com/office/drawing/2014/main" id="{2C09D557-5078-43A7-9B83-8FA728BF43E5}"/>
-              </a:ext>
-            </a:extLst>
-          </p:cNvPr>
-          <p:cNvSpPr txBox="1"/>
-          <p:nvPr/>
-        </p:nvSpPr>
-        <p:spPr>
-          <a:xfrm>
-            <a:off x="723900" y="1783555"/>
-            <a:ext cx="4421980" cy="923330"/>
-          </a:xfrm>
-          <a:prstGeom prst="rect">
-            <a:avLst/>
-          </a:prstGeom>
-          <a:noFill/>
-        </p:spPr>
-        <p:txBody>
-          <a:bodyPr rot="0" spcFirstLastPara="0" vertOverflow="overflow" horzOverflow="overflow" vert="horz" wrap="square" lIns="91440" tIns="45720" rIns="91440" bIns="45720" numCol="1" spcCol="0" rtlCol="0" fromWordArt="0" anchor="t" anchorCtr="0" forceAA="0" compatLnSpc="1">
-            <a:prstTxWarp prst="textNoShape">
-              <a:avLst/>
-            </a:prstTxWarp>
-            <a:spAutoFit/>
-          </a:bodyPr>
-          <a:lstStyle/>
-          <a:p>
-            <a:r>
-              <a:rPr lang="en-US" dirty="0"/>
-              <a:t>- Desktop 32 Zoll</a:t>
-            </a:r>
-          </a:p>
-          <a:p>
-            <a:r>
-              <a:rPr lang="en-US" dirty="0"/>
-              <a:t>- Laptop </a:t>
-            </a:r>
-            <a:r>
-              <a:rPr lang="en-US" dirty="0" err="1"/>
-              <a:t>Lenovoo</a:t>
-            </a:r>
-          </a:p>
-          <a:p>
-            <a:r>
-              <a:rPr lang="en-US" dirty="0"/>
-              <a:t>- Samsung S21</a:t>
-            </a:r>
-          </a:p>
-        </p:txBody>
-      </p:sp>
-      <p:pic>
-        <p:nvPicPr>
-          <p:cNvPr id="8" name="Picture 8">
-            <a:extLst>
-              <a:ext uri="{FF2B5EF4-FFF2-40B4-BE49-F238E27FC236}">
-                <a16:creationId xmlns:a16="http://schemas.microsoft.com/office/drawing/2014/main" id="{07EB022A-44D0-4932-A4F7-981248E7DE8D}"/>
-              </a:ext>
-            </a:extLst>
-          </p:cNvPr>
-          <p:cNvPicPr>
-            <a:picLocks noChangeAspect="1"/>
-          </p:cNvPicPr>
-          <p:nvPr/>
-        </p:nvPicPr>
-        <p:blipFill>
-          <a:blip r:embed="rId2"/>
-          <a:stretch>
-            <a:fillRect/>
-          </a:stretch>
-        </p:blipFill>
-        <p:spPr>
-          <a:xfrm>
-            <a:off x="3490132" y="1683915"/>
-            <a:ext cx="1199525" cy="1548670"/>
-          </a:xfrm>
-          <a:prstGeom prst="rect">
-            <a:avLst/>
-          </a:prstGeom>
-        </p:spPr>
-      </p:pic>
-      <p:sp>
-        <p:nvSpPr>
-          <p:cNvPr id="9" name="TextBox 8">
-            <a:extLst>
-              <a:ext uri="{FF2B5EF4-FFF2-40B4-BE49-F238E27FC236}">
-                <a16:creationId xmlns:a16="http://schemas.microsoft.com/office/drawing/2014/main" id="{B4E43B66-120C-4D8B-BF6F-EB68B82BE507}"/>
-              </a:ext>
-            </a:extLst>
-          </p:cNvPr>
-          <p:cNvSpPr txBox="1"/>
-          <p:nvPr/>
-        </p:nvSpPr>
-        <p:spPr>
-          <a:xfrm>
-            <a:off x="817588" y="4063309"/>
-            <a:ext cx="4421980" cy="1200329"/>
-          </a:xfrm>
-          <a:prstGeom prst="rect">
-            <a:avLst/>
-          </a:prstGeom>
-          <a:noFill/>
-        </p:spPr>
-        <p:txBody>
-          <a:bodyPr rot="0" spcFirstLastPara="0" vertOverflow="overflow" horzOverflow="overflow" vert="horz" wrap="square" lIns="91440" tIns="45720" rIns="91440" bIns="45720" numCol="1" spcCol="0" rtlCol="0" fromWordArt="0" anchor="t" anchorCtr="0" forceAA="0" compatLnSpc="1">
-            <a:prstTxWarp prst="textNoShape">
-              <a:avLst/>
-            </a:prstTxWarp>
-            <a:spAutoFit/>
-          </a:bodyPr>
-          <a:lstStyle/>
-          <a:p>
-            <a:r>
-              <a:rPr lang="en-US" b="1" dirty="0" err="1"/>
-              <a:t>Lession</a:t>
-            </a:r>
-            <a:r>
-              <a:rPr lang="en-US" b="1" dirty="0"/>
-              <a:t> Learned</a:t>
-            </a:r>
-          </a:p>
-          <a:p>
-            <a:r>
-              <a:rPr lang="en-US" dirty="0"/>
-              <a:t>- Gute </a:t>
-            </a:r>
-            <a:r>
-              <a:rPr lang="en-US" dirty="0" err="1"/>
-              <a:t>Strukturierung</a:t>
-            </a:r>
-            <a:r>
-              <a:rPr lang="en-US" dirty="0"/>
-              <a:t> (</a:t>
-            </a:r>
-            <a:r>
-              <a:rPr lang="en-US" dirty="0" err="1"/>
-              <a:t>OnePager</a:t>
-            </a:r>
-            <a:r>
-              <a:rPr lang="en-US" dirty="0"/>
-              <a:t>)</a:t>
-            </a:r>
-            <a:endParaRPr lang="en-US"/>
-          </a:p>
-          <a:p>
-            <a:r>
-              <a:rPr lang="en-US" dirty="0"/>
-              <a:t>- Responsive Design von Anfang</a:t>
-            </a:r>
-          </a:p>
-          <a:p>
-            <a:r>
-              <a:rPr lang="en-US" dirty="0"/>
-              <a:t>- Sehr </a:t>
-            </a:r>
-            <a:r>
-              <a:rPr lang="en-US" dirty="0" err="1"/>
-              <a:t>viel</a:t>
-            </a:r>
-            <a:r>
-              <a:rPr lang="en-US" dirty="0"/>
-              <a:t> </a:t>
-            </a:r>
-            <a:r>
-              <a:rPr lang="en-US" dirty="0" err="1"/>
-              <a:t>Aufwand</a:t>
-            </a:r>
-            <a:endParaRPr lang="en-US" dirty="0"/>
-          </a:p>
-        </p:txBody>
-      </p:sp>
-    </p:spTree>
-    <p:extLst>
-      <p:ext uri="{BB962C8B-B14F-4D97-AF65-F5344CB8AC3E}">
-        <p14:creationId xmlns:p14="http://schemas.microsoft.com/office/powerpoint/2010/main" val="4239837223"/>
-      </p:ext>
-    </p:extLst>
-  </p:cSld>
-  <p:clrMapOvr>
-    <a:masterClrMapping/>
-  </p:clrMapOvr>
-</p:sld>
-</file>
-
-<file path=ppt/slides/slide9.xml><?xml version="1.0" encoding="utf-8"?>
 <p:sld xmlns:a="http://schemas.openxmlformats.org/drawingml/2006/main" xmlns:r="http://schemas.openxmlformats.org/officeDocument/2006/relationships" xmlns:p="http://schemas.openxmlformats.org/presentationml/2006/main">
   <p:cSld>
     <p:spTree>
@@ -9764,12 +10240,11 @@
 </file>
 
 <file path=customXml/item1.xml><?xml version="1.0" encoding="utf-8"?>
-<?mso-contentType ?>
-<FormTemplates xmlns="http://schemas.microsoft.com/sharepoint/v3/contenttype/forms">
-  <Display>DocumentLibraryForm</Display>
-  <Edit>DocumentLibraryForm</Edit>
-  <New>DocumentLibraryForm</New>
-</FormTemplates>
+<p:properties xmlns:p="http://schemas.microsoft.com/office/2006/metadata/properties" xmlns:xsi="http://www.w3.org/2001/XMLSchema-instance" xmlns:pc="http://schemas.microsoft.com/office/infopath/2007/PartnerControls">
+  <documentManagement>
+    <MediaServiceKeyPoints xmlns="71af3243-3dd4-4a8d-8c0d-dd76da1f02a5" xsi:nil="true"/>
+  </documentManagement>
+</p:properties>
 </file>
 
 <file path=customXml/item2.xml><?xml version="1.0" encoding="utf-8"?>
@@ -9984,17 +10459,20 @@
 </file>
 
 <file path=customXml/item3.xml><?xml version="1.0" encoding="utf-8"?>
-<p:properties xmlns:p="http://schemas.microsoft.com/office/2006/metadata/properties" xmlns:xsi="http://www.w3.org/2001/XMLSchema-instance" xmlns:pc="http://schemas.microsoft.com/office/infopath/2007/PartnerControls">
-  <documentManagement>
-    <MediaServiceKeyPoints xmlns="71af3243-3dd4-4a8d-8c0d-dd76da1f02a5" xsi:nil="true"/>
-  </documentManagement>
-</p:properties>
+<?mso-contentType ?>
+<FormTemplates xmlns="http://schemas.microsoft.com/sharepoint/v3/contenttype/forms">
+  <Display>DocumentLibraryForm</Display>
+  <Edit>DocumentLibraryForm</Edit>
+  <New>DocumentLibraryForm</New>
+</FormTemplates>
 </file>
 
 <file path=customXml/itemProps1.xml><?xml version="1.0" encoding="utf-8"?>
-<ds:datastoreItem xmlns:ds="http://schemas.openxmlformats.org/officeDocument/2006/customXml" ds:itemID="{4F44C90D-2A62-4985-9618-3460247437B1}">
+<ds:datastoreItem xmlns:ds="http://schemas.openxmlformats.org/officeDocument/2006/customXml" ds:itemID="{788A2F88-55C5-4ED1-9541-807C65424763}">
   <ds:schemaRefs>
-    <ds:schemaRef ds:uri="http://schemas.microsoft.com/sharepoint/v3/contenttype/forms"/>
+    <ds:schemaRef ds:uri="http://schemas.microsoft.com/office/2006/metadata/properties"/>
+    <ds:schemaRef ds:uri="http://schemas.microsoft.com/office/infopath/2007/PartnerControls"/>
+    <ds:schemaRef ds:uri="71af3243-3dd4-4a8d-8c0d-dd76da1f02a5"/>
   </ds:schemaRefs>
 </ds:datastoreItem>
 </file>
@@ -10019,11 +10497,9 @@
 </file>
 
 <file path=customXml/itemProps3.xml><?xml version="1.0" encoding="utf-8"?>
-<ds:datastoreItem xmlns:ds="http://schemas.openxmlformats.org/officeDocument/2006/customXml" ds:itemID="{788A2F88-55C5-4ED1-9541-807C65424763}">
+<ds:datastoreItem xmlns:ds="http://schemas.openxmlformats.org/officeDocument/2006/customXml" ds:itemID="{4F44C90D-2A62-4985-9618-3460247437B1}">
   <ds:schemaRefs>
-    <ds:schemaRef ds:uri="http://schemas.microsoft.com/office/2006/metadata/properties"/>
-    <ds:schemaRef ds:uri="http://schemas.microsoft.com/office/infopath/2007/PartnerControls"/>
-    <ds:schemaRef ds:uri="71af3243-3dd4-4a8d-8c0d-dd76da1f02a5"/>
+    <ds:schemaRef ds:uri="http://schemas.microsoft.com/sharepoint/v3/contenttype/forms"/>
   </ds:schemaRefs>
 </ds:datastoreItem>
 </file>
</xml_diff>